<commit_message>
Added API Usage Diagram to PowerPoint
</commit_message>
<xml_diff>
--- a/Documents/Presentation3.pptx
+++ b/Documents/Presentation3.pptx
@@ -5,18 +5,19 @@
     <p:sldMasterId id="2147483708" r:id="rId1"/>
   </p:sldMasterIdLst>
   <p:notesMasterIdLst>
-    <p:notesMasterId r:id="rId11"/>
+    <p:notesMasterId r:id="rId12"/>
   </p:notesMasterIdLst>
   <p:sldIdLst>
     <p:sldId id="257" r:id="rId2"/>
     <p:sldId id="259" r:id="rId3"/>
     <p:sldId id="273" r:id="rId4"/>
     <p:sldId id="272" r:id="rId5"/>
-    <p:sldId id="274" r:id="rId6"/>
-    <p:sldId id="271" r:id="rId7"/>
-    <p:sldId id="261" r:id="rId8"/>
-    <p:sldId id="262" r:id="rId9"/>
-    <p:sldId id="258" r:id="rId10"/>
+    <p:sldId id="275" r:id="rId6"/>
+    <p:sldId id="274" r:id="rId7"/>
+    <p:sldId id="271" r:id="rId8"/>
+    <p:sldId id="261" r:id="rId9"/>
+    <p:sldId id="262" r:id="rId10"/>
+    <p:sldId id="258" r:id="rId11"/>
   </p:sldIdLst>
   <p:sldSz cx="9144000" cy="6858000" type="screen4x3"/>
   <p:notesSz cx="6858000" cy="9144000"/>
@@ -709,7 +710,7 @@
           <a:p>
             <a:fld id="{D126F95B-AEDF-4270-8E27-52D0E1D8B814}" type="slidenum">
               <a:rPr lang="en-US" smtClean="0"/>
-              <a:t>7</a:t>
+              <a:t>8</a:t>
             </a:fld>
             <a:endParaRPr lang="en-US"/>
           </a:p>
@@ -797,7 +798,7 @@
           <a:p>
             <a:fld id="{D126F95B-AEDF-4270-8E27-52D0E1D8B814}" type="slidenum">
               <a:rPr lang="en-US" smtClean="0"/>
-              <a:t>8</a:t>
+              <a:t>9</a:t>
             </a:fld>
             <a:endParaRPr lang="en-US"/>
           </a:p>
@@ -885,7 +886,7 @@
           <a:p>
             <a:fld id="{D126F95B-AEDF-4270-8E27-52D0E1D8B814}" type="slidenum">
               <a:rPr lang="en-US" smtClean="0"/>
-              <a:t>9</a:t>
+              <a:t>10</a:t>
             </a:fld>
             <a:endParaRPr lang="en-US"/>
           </a:p>
@@ -5452,6 +5453,66 @@
 </p:sld>
 </file>
 
+<file path=ppt/slides/slide10.xml><?xml version="1.0" encoding="utf-8"?>
+<p:sld xmlns:a="http://schemas.openxmlformats.org/drawingml/2006/main" xmlns:r="http://schemas.openxmlformats.org/officeDocument/2006/relationships" xmlns:p="http://schemas.openxmlformats.org/presentationml/2006/main">
+  <p:cSld>
+    <p:spTree>
+      <p:nvGrpSpPr>
+        <p:cNvPr id="1" name=""/>
+        <p:cNvGrpSpPr/>
+        <p:nvPr/>
+      </p:nvGrpSpPr>
+      <p:grpSpPr>
+        <a:xfrm>
+          <a:off x="0" y="0"/>
+          <a:ext cx="0" cy="0"/>
+          <a:chOff x="0" y="0"/>
+          <a:chExt cx="0" cy="0"/>
+        </a:xfrm>
+      </p:grpSpPr>
+      <p:sp>
+        <p:nvSpPr>
+          <p:cNvPr id="3" name="Title 2"/>
+          <p:cNvSpPr>
+            <a:spLocks noGrp="1"/>
+          </p:cNvSpPr>
+          <p:nvPr>
+            <p:ph type="title"/>
+          </p:nvPr>
+        </p:nvSpPr>
+        <p:spPr/>
+        <p:txBody>
+          <a:bodyPr/>
+          <a:lstStyle/>
+          <a:p>
+            <a:r>
+              <a:rPr lang="en-US" dirty="0" smtClean="0"/>
+              <a:t>Questions?</a:t>
+            </a:r>
+            <a:endParaRPr lang="en-US" dirty="0"/>
+          </a:p>
+        </p:txBody>
+      </p:sp>
+    </p:spTree>
+    <p:extLst>
+      <p:ext uri="{BB962C8B-B14F-4D97-AF65-F5344CB8AC3E}">
+        <p14:creationId xmlns:p14="http://schemas.microsoft.com/office/powerpoint/2010/main" val="967507963"/>
+      </p:ext>
+    </p:extLst>
+  </p:cSld>
+  <p:clrMapOvr>
+    <a:masterClrMapping/>
+  </p:clrMapOvr>
+  <p:timing>
+    <p:tnLst>
+      <p:par>
+        <p:cTn xmlns:p14="http://schemas.microsoft.com/office/powerpoint/2010/main" id="1" dur="indefinite" restart="never" nodeType="tmRoot"/>
+      </p:par>
+    </p:tnLst>
+  </p:timing>
+</p:sld>
+</file>
+
 <file path=ppt/slides/slide2.xml><?xml version="1.0" encoding="utf-8"?>
 <p:sld xmlns:a="http://schemas.openxmlformats.org/drawingml/2006/main" xmlns:r="http://schemas.openxmlformats.org/officeDocument/2006/relationships" xmlns:p="http://schemas.openxmlformats.org/presentationml/2006/main">
   <p:cSld>
@@ -5491,11 +5552,7 @@
             </a:pPr>
             <a:r>
               <a:rPr lang="en-US" dirty="0" smtClean="0"/>
-              <a:t>Innovative </a:t>
-            </a:r>
-            <a:r>
-              <a:rPr lang="en-US" dirty="0" smtClean="0"/>
-              <a:t>Systems </a:t>
+              <a:t>Innovative Systems </a:t>
             </a:r>
           </a:p>
           <a:p>
@@ -5887,6 +5944,13 @@
   <p:clrMapOvr>
     <a:masterClrMapping/>
   </p:clrMapOvr>
+  <p:timing>
+    <p:tnLst>
+      <p:par>
+        <p:cTn xmlns:p14="http://schemas.microsoft.com/office/powerpoint/2010/main" id="1" dur="indefinite" restart="never" nodeType="tmRoot"/>
+      </p:par>
+    </p:tnLst>
+  </p:timing>
 </p:sld>
 </file>
 
@@ -5907,125 +5971,67 @@
           <a:chExt cx="0" cy="0"/>
         </a:xfrm>
       </p:grpSpPr>
-      <p:sp>
-        <p:nvSpPr>
-          <p:cNvPr id="2" name="Content Placeholder 1"/>
-          <p:cNvSpPr>
-            <a:spLocks noGrp="1"/>
-          </p:cNvSpPr>
-          <p:nvPr>
-            <p:ph idx="1"/>
-          </p:nvPr>
-        </p:nvSpPr>
-        <p:spPr/>
+      <p:pic>
+        <p:nvPicPr>
+          <p:cNvPr id="6" name="Picture 5" descr="UsageFlow.png"/>
+          <p:cNvPicPr>
+            <a:picLocks noChangeAspect="1"/>
+          </p:cNvPicPr>
+          <p:nvPr/>
+        </p:nvPicPr>
+        <p:blipFill rotWithShape="1">
+          <a:blip r:embed="rId2" cstate="print">
+            <a:extLst>
+              <a:ext uri="{28A0092B-C50C-407E-A947-70E740481C1C}">
+                <a14:useLocalDpi xmlns:a14="http://schemas.microsoft.com/office/drawing/2010/main" val="0"/>
+              </a:ext>
+            </a:extLst>
+          </a:blip>
+          <a:srcRect t="18375" r="33712" b="23920"/>
+          <a:stretch/>
+        </p:blipFill>
+        <p:spPr>
+          <a:xfrm>
+            <a:off x="3124200" y="381000"/>
+            <a:ext cx="5353172" cy="6030626"/>
+          </a:xfrm>
+          <a:prstGeom prst="rect">
+            <a:avLst/>
+          </a:prstGeom>
+        </p:spPr>
+      </p:pic>
+      <p:sp>
+        <p:nvSpPr>
+          <p:cNvPr id="3" name="Title 2"/>
+          <p:cNvSpPr>
+            <a:spLocks noGrp="1"/>
+          </p:cNvSpPr>
+          <p:nvPr>
+            <p:ph type="title"/>
+          </p:nvPr>
+        </p:nvSpPr>
+        <p:spPr>
+          <a:xfrm>
+            <a:off x="457200" y="274638"/>
+            <a:ext cx="8229600" cy="1782762"/>
+          </a:xfrm>
+        </p:spPr>
         <p:txBody>
           <a:bodyPr>
-            <a:normAutofit lnSpcReduction="10000"/>
+            <a:normAutofit/>
           </a:bodyPr>
           <a:lstStyle/>
           <a:p>
             <a:r>
               <a:rPr lang="en-US" dirty="0" smtClean="0"/>
-              <a:t>Tested and Documented Technician App</a:t>
-            </a:r>
-          </a:p>
-          <a:p>
-            <a:pPr lvl="1"/>
-            <a:r>
+              <a:t>API Usage </a:t>
+            </a:r>
+            <a:br>
               <a:rPr lang="en-US" dirty="0" smtClean="0"/>
-              <a:t>Username and Password Authentication</a:t>
-            </a:r>
-          </a:p>
-          <a:p>
-            <a:pPr lvl="1"/>
+            </a:br>
             <a:r>
               <a:rPr lang="en-US" dirty="0" smtClean="0"/>
-              <a:t>View Device Diagnostics</a:t>
-            </a:r>
-          </a:p>
-          <a:p>
-            <a:pPr lvl="1"/>
-            <a:r>
-              <a:rPr lang="en-US" dirty="0" smtClean="0"/>
-              <a:t>Save Location Accounts for Easy Access</a:t>
-            </a:r>
-          </a:p>
-          <a:p>
-            <a:r>
-              <a:rPr lang="en-US" dirty="0" smtClean="0"/>
-              <a:t>Tested and Documented eBill App</a:t>
-            </a:r>
-          </a:p>
-          <a:p>
-            <a:pPr lvl="1"/>
-            <a:r>
-              <a:rPr lang="en-US" dirty="0" smtClean="0"/>
-              <a:t>Username and Password Authentication</a:t>
-            </a:r>
-          </a:p>
-          <a:p>
-            <a:pPr lvl="1"/>
-            <a:r>
-              <a:rPr lang="en-US" dirty="0" smtClean="0"/>
-              <a:t>View/Modify Account Information</a:t>
-            </a:r>
-          </a:p>
-          <a:p>
-            <a:pPr lvl="1"/>
-            <a:r>
-              <a:rPr lang="en-US" dirty="0" smtClean="0"/>
-              <a:t>View Payment </a:t>
-            </a:r>
-            <a:r>
-              <a:rPr lang="en-US" dirty="0"/>
-              <a:t>H</a:t>
-            </a:r>
-            <a:r>
-              <a:rPr lang="en-US" dirty="0" smtClean="0"/>
-              <a:t>istory and Make New Payments</a:t>
-            </a:r>
-          </a:p>
-          <a:p>
-            <a:pPr lvl="1"/>
-            <a:r>
-              <a:rPr lang="en-US" dirty="0" smtClean="0"/>
-              <a:t>View Invoice Overviews or Full .PDF files</a:t>
-            </a:r>
-          </a:p>
-          <a:p>
-            <a:pPr lvl="1"/>
-            <a:r>
-              <a:rPr lang="en-US" dirty="0" smtClean="0"/>
-              <a:t>View Current Usage </a:t>
-            </a:r>
-          </a:p>
-          <a:p>
-            <a:pPr lvl="1"/>
-            <a:r>
-              <a:rPr lang="en-US" dirty="0" smtClean="0"/>
-              <a:t>Display Support Information and Allow Trouble Ticket Submission</a:t>
-            </a:r>
-          </a:p>
-        </p:txBody>
-      </p:sp>
-      <p:sp>
-        <p:nvSpPr>
-          <p:cNvPr id="3" name="Title 2"/>
-          <p:cNvSpPr>
-            <a:spLocks noGrp="1"/>
-          </p:cNvSpPr>
-          <p:nvPr>
-            <p:ph type="title"/>
-          </p:nvPr>
-        </p:nvSpPr>
-        <p:spPr/>
-        <p:txBody>
-          <a:bodyPr/>
-          <a:lstStyle/>
-          <a:p>
-            <a:r>
-              <a:rPr lang="en-US" dirty="0" smtClean="0"/>
-              <a:t>Planned Deliverables</a:t>
+              <a:t>Diagram</a:t>
             </a:r>
             <a:endParaRPr lang="en-US" dirty="0"/>
           </a:p>
@@ -6034,13 +6040,20 @@
     </p:spTree>
     <p:extLst>
       <p:ext uri="{BB962C8B-B14F-4D97-AF65-F5344CB8AC3E}">
-        <p14:creationId xmlns:p14="http://schemas.microsoft.com/office/powerpoint/2010/main" val="2977110235"/>
+        <p14:creationId xmlns:p14="http://schemas.microsoft.com/office/powerpoint/2010/main" val="208352376"/>
       </p:ext>
     </p:extLst>
   </p:cSld>
   <p:clrMapOvr>
     <a:masterClrMapping/>
   </p:clrMapOvr>
+  <p:timing>
+    <p:tnLst>
+      <p:par>
+        <p:cTn xmlns:p14="http://schemas.microsoft.com/office/powerpoint/2010/main" id="1" dur="indefinite" restart="never" nodeType="tmRoot"/>
+      </p:par>
+    </p:tnLst>
+  </p:timing>
 </p:sld>
 </file>
 
@@ -6074,70 +6087,91 @@
         <p:spPr/>
         <p:txBody>
           <a:bodyPr>
-            <a:normAutofit/>
+            <a:normAutofit lnSpcReduction="10000"/>
           </a:bodyPr>
           <a:lstStyle/>
           <a:p>
             <a:r>
               <a:rPr lang="en-US" dirty="0" smtClean="0"/>
-              <a:t>Technician App</a:t>
+              <a:t>Tested and Documented Technician App</a:t>
             </a:r>
           </a:p>
           <a:p>
             <a:pPr lvl="1"/>
             <a:r>
               <a:rPr lang="en-US" dirty="0" smtClean="0"/>
-              <a:t>Testing and Documentation</a:t>
-            </a:r>
-          </a:p>
-          <a:p>
+              <a:t>Username and Password Authentication</a:t>
+            </a:r>
+          </a:p>
+          <a:p>
+            <a:pPr lvl="1"/>
             <a:r>
               <a:rPr lang="en-US" dirty="0" smtClean="0"/>
-              <a:t>eBill App</a:t>
+              <a:t>View Device Diagnostics</a:t>
             </a:r>
           </a:p>
           <a:p>
             <a:pPr lvl="1"/>
             <a:r>
               <a:rPr lang="en-US" dirty="0" smtClean="0"/>
-              <a:t>Testing and Documentation</a:t>
+              <a:t>Save Location Accounts for Easy Access</a:t>
+            </a:r>
+          </a:p>
+          <a:p>
+            <a:r>
+              <a:rPr lang="en-US" dirty="0" smtClean="0"/>
+              <a:t>Tested and Documented eBill App</a:t>
             </a:r>
           </a:p>
           <a:p>
             <a:pPr lvl="1"/>
             <a:r>
+              <a:rPr lang="en-US" dirty="0" smtClean="0"/>
+              <a:t>Username and Password Authentication</a:t>
+            </a:r>
+          </a:p>
+          <a:p>
+            <a:pPr lvl="1"/>
+            <a:r>
+              <a:rPr lang="en-US" dirty="0" smtClean="0"/>
+              <a:t>View/Modify Account Information</a:t>
+            </a:r>
+          </a:p>
+          <a:p>
+            <a:pPr lvl="1"/>
+            <a:r>
+              <a:rPr lang="en-US" dirty="0" smtClean="0"/>
+              <a:t>View Payment </a:t>
+            </a:r>
+            <a:r>
               <a:rPr lang="en-US" dirty="0"/>
-              <a:t>Display Support Information and Allow Trouble Ticket </a:t>
+              <a:t>H</a:t>
             </a:r>
             <a:r>
               <a:rPr lang="en-US" dirty="0" smtClean="0"/>
-              <a:t>Submission</a:t>
+              <a:t>istory and Make New Payments</a:t>
             </a:r>
           </a:p>
           <a:p>
             <a:pPr lvl="1"/>
             <a:r>
               <a:rPr lang="en-US" dirty="0" smtClean="0"/>
-              <a:t>Minor Account Information Modifications</a:t>
-            </a:r>
-          </a:p>
-          <a:p>
+              <a:t>View Invoice Overviews or Full .PDF files</a:t>
+            </a:r>
+          </a:p>
+          <a:p>
+            <a:pPr lvl="1"/>
             <a:r>
               <a:rPr lang="en-US" dirty="0" smtClean="0"/>
-              <a:t>API</a:t>
+              <a:t>View Current Usage </a:t>
             </a:r>
           </a:p>
           <a:p>
             <a:pPr lvl="1"/>
             <a:r>
               <a:rPr lang="en-US" dirty="0" smtClean="0"/>
-              <a:t>Testing and Documentation</a:t>
-            </a:r>
-            <a:endParaRPr lang="en-US" dirty="0"/>
-          </a:p>
-          <a:p>
-            <a:pPr lvl="1"/>
-            <a:endParaRPr lang="en-US" dirty="0"/>
+              <a:t>Display Support Information and Allow Trouble Ticket Submission</a:t>
+            </a:r>
           </a:p>
         </p:txBody>
       </p:sp>
@@ -6153,14 +6187,12 @@
         </p:nvSpPr>
         <p:spPr/>
         <p:txBody>
-          <a:bodyPr>
-            <a:normAutofit/>
-          </a:bodyPr>
+          <a:bodyPr/>
           <a:lstStyle/>
           <a:p>
             <a:r>
               <a:rPr lang="en-US" dirty="0" smtClean="0"/>
-              <a:t>What’s Left</a:t>
+              <a:t>Planned Deliverables</a:t>
             </a:r>
             <a:endParaRPr lang="en-US" dirty="0"/>
           </a:p>
@@ -6169,13 +6201,20 @@
     </p:spTree>
     <p:extLst>
       <p:ext uri="{BB962C8B-B14F-4D97-AF65-F5344CB8AC3E}">
-        <p14:creationId xmlns:p14="http://schemas.microsoft.com/office/powerpoint/2010/main" val="4062817322"/>
+        <p14:creationId xmlns:p14="http://schemas.microsoft.com/office/powerpoint/2010/main" val="2977110235"/>
       </p:ext>
     </p:extLst>
   </p:cSld>
   <p:clrMapOvr>
     <a:masterClrMapping/>
   </p:clrMapOvr>
+  <p:timing>
+    <p:tnLst>
+      <p:par>
+        <p:cTn xmlns:p14="http://schemas.microsoft.com/office/powerpoint/2010/main" id="1" dur="indefinite" restart="never" nodeType="tmRoot"/>
+      </p:par>
+    </p:tnLst>
+  </p:timing>
 </p:sld>
 </file>
 
@@ -6208,28 +6247,6 @@
         </p:nvSpPr>
         <p:spPr/>
         <p:txBody>
-          <a:bodyPr/>
-          <a:lstStyle/>
-          <a:p>
-            <a:r>
-              <a:rPr lang="en-US" dirty="0" smtClean="0"/>
-              <a:t>Apple</a:t>
-            </a:r>
-          </a:p>
-        </p:txBody>
-      </p:sp>
-      <p:sp>
-        <p:nvSpPr>
-          <p:cNvPr id="3" name="Title 2"/>
-          <p:cNvSpPr>
-            <a:spLocks noGrp="1"/>
-          </p:cNvSpPr>
-          <p:nvPr>
-            <p:ph type="title"/>
-          </p:nvPr>
-        </p:nvSpPr>
-        <p:spPr/>
-        <p:txBody>
           <a:bodyPr>
             <a:normAutofit/>
           </a:bodyPr>
@@ -6237,11 +6254,87 @@
           <a:p>
             <a:r>
               <a:rPr lang="en-US" dirty="0" smtClean="0"/>
-              <a:t>eBill App </a:t>
-            </a:r>
+              <a:t>Technician App</a:t>
+            </a:r>
+          </a:p>
+          <a:p>
+            <a:pPr lvl="1"/>
             <a:r>
               <a:rPr lang="en-US" dirty="0" smtClean="0"/>
-              <a:t>Demo</a:t>
+              <a:t>Testing and Documentation</a:t>
+            </a:r>
+          </a:p>
+          <a:p>
+            <a:r>
+              <a:rPr lang="en-US" dirty="0" smtClean="0"/>
+              <a:t>eBill App</a:t>
+            </a:r>
+          </a:p>
+          <a:p>
+            <a:pPr lvl="1"/>
+            <a:r>
+              <a:rPr lang="en-US" dirty="0" smtClean="0"/>
+              <a:t>Testing and Documentation</a:t>
+            </a:r>
+          </a:p>
+          <a:p>
+            <a:pPr lvl="1"/>
+            <a:r>
+              <a:rPr lang="en-US" dirty="0"/>
+              <a:t>Display Support Information and Allow Trouble Ticket </a:t>
+            </a:r>
+            <a:r>
+              <a:rPr lang="en-US" dirty="0" smtClean="0"/>
+              <a:t>Submission</a:t>
+            </a:r>
+          </a:p>
+          <a:p>
+            <a:pPr lvl="1"/>
+            <a:r>
+              <a:rPr lang="en-US" dirty="0" smtClean="0"/>
+              <a:t>Minor Account Information Modifications</a:t>
+            </a:r>
+          </a:p>
+          <a:p>
+            <a:r>
+              <a:rPr lang="en-US" dirty="0" smtClean="0"/>
+              <a:t>API</a:t>
+            </a:r>
+          </a:p>
+          <a:p>
+            <a:pPr lvl="1"/>
+            <a:r>
+              <a:rPr lang="en-US" dirty="0" smtClean="0"/>
+              <a:t>Testing and Documentation</a:t>
+            </a:r>
+            <a:endParaRPr lang="en-US" dirty="0"/>
+          </a:p>
+          <a:p>
+            <a:pPr lvl="1"/>
+            <a:endParaRPr lang="en-US" dirty="0"/>
+          </a:p>
+        </p:txBody>
+      </p:sp>
+      <p:sp>
+        <p:nvSpPr>
+          <p:cNvPr id="3" name="Title 2"/>
+          <p:cNvSpPr>
+            <a:spLocks noGrp="1"/>
+          </p:cNvSpPr>
+          <p:nvPr>
+            <p:ph type="title"/>
+          </p:nvPr>
+        </p:nvSpPr>
+        <p:spPr/>
+        <p:txBody>
+          <a:bodyPr>
+            <a:normAutofit/>
+          </a:bodyPr>
+          <a:lstStyle/>
+          <a:p>
+            <a:r>
+              <a:rPr lang="en-US" dirty="0" smtClean="0"/>
+              <a:t>What’s Left</a:t>
             </a:r>
             <a:endParaRPr lang="en-US" dirty="0"/>
           </a:p>
@@ -6250,7 +6343,7 @@
     </p:spTree>
     <p:extLst>
       <p:ext uri="{BB962C8B-B14F-4D97-AF65-F5344CB8AC3E}">
-        <p14:creationId xmlns:p14="http://schemas.microsoft.com/office/powerpoint/2010/main" val="540060562"/>
+        <p14:creationId xmlns:p14="http://schemas.microsoft.com/office/powerpoint/2010/main" val="4062817322"/>
       </p:ext>
     </p:extLst>
   </p:cSld>
@@ -6301,15 +6394,8 @@
           <a:p>
             <a:r>
               <a:rPr lang="en-US" dirty="0" smtClean="0"/>
-              <a:t>Android</a:t>
-            </a:r>
-            <a:endParaRPr lang="en-US" dirty="0"/>
-          </a:p>
-          <a:p>
-            <a:pPr marL="109728" indent="0">
-              <a:buNone/>
-            </a:pPr>
-            <a:endParaRPr lang="en-US" dirty="0"/>
+              <a:t>Apple</a:t>
+            </a:r>
           </a:p>
         </p:txBody>
       </p:sp>
@@ -6325,16 +6411,14 @@
         </p:nvSpPr>
         <p:spPr/>
         <p:txBody>
-          <a:bodyPr/>
+          <a:bodyPr>
+            <a:normAutofit/>
+          </a:bodyPr>
           <a:lstStyle/>
           <a:p>
             <a:r>
               <a:rPr lang="en-US" dirty="0" smtClean="0"/>
-              <a:t>Technician App </a:t>
-            </a:r>
-            <a:r>
-              <a:rPr lang="en-US" dirty="0" smtClean="0"/>
-              <a:t>Demo</a:t>
+              <a:t>eBill App Demo</a:t>
             </a:r>
             <a:endParaRPr lang="en-US" dirty="0"/>
           </a:p>
@@ -6343,7 +6427,7 @@
     </p:spTree>
     <p:extLst>
       <p:ext uri="{BB962C8B-B14F-4D97-AF65-F5344CB8AC3E}">
-        <p14:creationId xmlns:p14="http://schemas.microsoft.com/office/powerpoint/2010/main" val="2870317666"/>
+        <p14:creationId xmlns:p14="http://schemas.microsoft.com/office/powerpoint/2010/main" val="540060562"/>
       </p:ext>
     </p:extLst>
   </p:cSld>
@@ -6379,12 +6463,12 @@
       </p:grpSpPr>
       <p:sp>
         <p:nvSpPr>
-          <p:cNvPr id="3" name="Title 2"/>
-          <p:cNvSpPr>
-            <a:spLocks noGrp="1"/>
-          </p:cNvSpPr>
-          <p:nvPr>
-            <p:ph type="title"/>
+          <p:cNvPr id="2" name="Content Placeholder 1"/>
+          <p:cNvSpPr>
+            <a:spLocks noGrp="1"/>
+          </p:cNvSpPr>
+          <p:nvPr>
+            <p:ph idx="1"/>
           </p:nvPr>
         </p:nvSpPr>
         <p:spPr/>
@@ -6394,7 +6478,36 @@
           <a:p>
             <a:r>
               <a:rPr lang="en-US" dirty="0" smtClean="0"/>
-              <a:t>Questions?</a:t>
+              <a:t>Android</a:t>
+            </a:r>
+            <a:endParaRPr lang="en-US" dirty="0"/>
+          </a:p>
+          <a:p>
+            <a:pPr marL="109728" indent="0">
+              <a:buNone/>
+            </a:pPr>
+            <a:endParaRPr lang="en-US" dirty="0"/>
+          </a:p>
+        </p:txBody>
+      </p:sp>
+      <p:sp>
+        <p:nvSpPr>
+          <p:cNvPr id="3" name="Title 2"/>
+          <p:cNvSpPr>
+            <a:spLocks noGrp="1"/>
+          </p:cNvSpPr>
+          <p:nvPr>
+            <p:ph type="title"/>
+          </p:nvPr>
+        </p:nvSpPr>
+        <p:spPr/>
+        <p:txBody>
+          <a:bodyPr/>
+          <a:lstStyle/>
+          <a:p>
+            <a:r>
+              <a:rPr lang="en-US" dirty="0" smtClean="0"/>
+              <a:t>Technician App Demo</a:t>
             </a:r>
             <a:endParaRPr lang="en-US" dirty="0"/>
           </a:p>
@@ -6403,7 +6516,7 @@
     </p:spTree>
     <p:extLst>
       <p:ext uri="{BB962C8B-B14F-4D97-AF65-F5344CB8AC3E}">
-        <p14:creationId xmlns:p14="http://schemas.microsoft.com/office/powerpoint/2010/main" val="967507963"/>
+        <p14:creationId xmlns:p14="http://schemas.microsoft.com/office/powerpoint/2010/main" val="2870317666"/>
       </p:ext>
     </p:extLst>
   </p:cSld>

</xml_diff>